<commit_message>
version initiale du projet
</commit_message>
<xml_diff>
--- a/Rapport/IdéeJPA.pptx
+++ b/Rapport/IdéeJPA.pptx
@@ -291,7 +291,7 @@
           <a:p>
             <a:fld id="{16717350-796B-4695-9323-A84E4C71C2FB}" type="datetimeFigureOut">
               <a:rPr lang="fr-CH" smtClean="0"/>
-              <a:t>08.03.2013</a:t>
+              <a:t>15.03.2013</a:t>
             </a:fld>
             <a:endParaRPr lang="fr-CH"/>
           </a:p>
@@ -461,7 +461,7 @@
           <a:p>
             <a:fld id="{16717350-796B-4695-9323-A84E4C71C2FB}" type="datetimeFigureOut">
               <a:rPr lang="fr-CH" smtClean="0"/>
-              <a:t>08.03.2013</a:t>
+              <a:t>15.03.2013</a:t>
             </a:fld>
             <a:endParaRPr lang="fr-CH"/>
           </a:p>
@@ -641,7 +641,7 @@
           <a:p>
             <a:fld id="{16717350-796B-4695-9323-A84E4C71C2FB}" type="datetimeFigureOut">
               <a:rPr lang="fr-CH" smtClean="0"/>
-              <a:t>08.03.2013</a:t>
+              <a:t>15.03.2013</a:t>
             </a:fld>
             <a:endParaRPr lang="fr-CH"/>
           </a:p>
@@ -811,7 +811,7 @@
           <a:p>
             <a:fld id="{16717350-796B-4695-9323-A84E4C71C2FB}" type="datetimeFigureOut">
               <a:rPr lang="fr-CH" smtClean="0"/>
-              <a:t>08.03.2013</a:t>
+              <a:t>15.03.2013</a:t>
             </a:fld>
             <a:endParaRPr lang="fr-CH"/>
           </a:p>
@@ -1057,7 +1057,7 @@
           <a:p>
             <a:fld id="{16717350-796B-4695-9323-A84E4C71C2FB}" type="datetimeFigureOut">
               <a:rPr lang="fr-CH" smtClean="0"/>
-              <a:t>08.03.2013</a:t>
+              <a:t>15.03.2013</a:t>
             </a:fld>
             <a:endParaRPr lang="fr-CH"/>
           </a:p>
@@ -1345,7 +1345,7 @@
           <a:p>
             <a:fld id="{16717350-796B-4695-9323-A84E4C71C2FB}" type="datetimeFigureOut">
               <a:rPr lang="fr-CH" smtClean="0"/>
-              <a:t>08.03.2013</a:t>
+              <a:t>15.03.2013</a:t>
             </a:fld>
             <a:endParaRPr lang="fr-CH"/>
           </a:p>
@@ -1767,7 +1767,7 @@
           <a:p>
             <a:fld id="{16717350-796B-4695-9323-A84E4C71C2FB}" type="datetimeFigureOut">
               <a:rPr lang="fr-CH" smtClean="0"/>
-              <a:t>08.03.2013</a:t>
+              <a:t>15.03.2013</a:t>
             </a:fld>
             <a:endParaRPr lang="fr-CH"/>
           </a:p>
@@ -1885,7 +1885,7 @@
           <a:p>
             <a:fld id="{16717350-796B-4695-9323-A84E4C71C2FB}" type="datetimeFigureOut">
               <a:rPr lang="fr-CH" smtClean="0"/>
-              <a:t>08.03.2013</a:t>
+              <a:t>15.03.2013</a:t>
             </a:fld>
             <a:endParaRPr lang="fr-CH"/>
           </a:p>
@@ -1980,7 +1980,7 @@
           <a:p>
             <a:fld id="{16717350-796B-4695-9323-A84E4C71C2FB}" type="datetimeFigureOut">
               <a:rPr lang="fr-CH" smtClean="0"/>
-              <a:t>08.03.2013</a:t>
+              <a:t>15.03.2013</a:t>
             </a:fld>
             <a:endParaRPr lang="fr-CH"/>
           </a:p>
@@ -2257,7 +2257,7 @@
           <a:p>
             <a:fld id="{16717350-796B-4695-9323-A84E4C71C2FB}" type="datetimeFigureOut">
               <a:rPr lang="fr-CH" smtClean="0"/>
-              <a:t>08.03.2013</a:t>
+              <a:t>15.03.2013</a:t>
             </a:fld>
             <a:endParaRPr lang="fr-CH"/>
           </a:p>
@@ -2510,7 +2510,7 @@
           <a:p>
             <a:fld id="{16717350-796B-4695-9323-A84E4C71C2FB}" type="datetimeFigureOut">
               <a:rPr lang="fr-CH" smtClean="0"/>
-              <a:t>08.03.2013</a:t>
+              <a:t>15.03.2013</a:t>
             </a:fld>
             <a:endParaRPr lang="fr-CH"/>
           </a:p>
@@ -2723,7 +2723,7 @@
           <a:p>
             <a:fld id="{16717350-796B-4695-9323-A84E4C71C2FB}" type="datetimeFigureOut">
               <a:rPr lang="fr-CH" smtClean="0"/>
-              <a:t>08.03.2013</a:t>
+              <a:t>15.03.2013</a:t>
             </a:fld>
             <a:endParaRPr lang="fr-CH"/>
           </a:p>
@@ -3334,7 +3334,19 @@
           <a:p>
             <a:r>
               <a:rPr lang="fr-CH" dirty="0" smtClean="0"/>
-              <a:t>Relation entre les classes?</a:t>
+              <a:t>Relation entre les </a:t>
+            </a:r>
+            <a:r>
+              <a:rPr lang="fr-CH" dirty="0" smtClean="0"/>
+              <a:t>classes d’</a:t>
+            </a:r>
+            <a:r>
+              <a:rPr lang="fr-CH" dirty="0" err="1" smtClean="0"/>
+              <a:t>entiés</a:t>
+            </a:r>
+            <a:r>
+              <a:rPr lang="fr-CH" dirty="0" smtClean="0"/>
+              <a:t>?</a:t>
             </a:r>
             <a:endParaRPr lang="fr-CH" dirty="0"/>
           </a:p>
@@ -3431,21 +3443,17 @@
           <a:p>
             <a:r>
               <a:rPr lang="fr-CH" dirty="0" smtClean="0"/>
-              <a:t>Lire pro Git (les 2 </a:t>
-            </a:r>
-            <a:r>
-              <a:rPr lang="fr-CH" smtClean="0"/>
-              <a:t>1</a:t>
-            </a:r>
-            <a:r>
-              <a:rPr lang="fr-CH" baseline="30000" smtClean="0"/>
+              <a:t>Lire pro Git (les 2 1</a:t>
+            </a:r>
+            <a:r>
+              <a:rPr lang="fr-CH" baseline="30000" dirty="0" smtClean="0"/>
               <a:t>er</a:t>
             </a:r>
             <a:r>
-              <a:rPr lang="fr-CH" smtClean="0"/>
+              <a:rPr lang="fr-CH" dirty="0" smtClean="0"/>
               <a:t> chapitres)</a:t>
             </a:r>
-            <a:endParaRPr lang="fr-CH"/>
+            <a:endParaRPr lang="fr-CH" dirty="0"/>
           </a:p>
         </p:txBody>
       </p:sp>

</xml_diff>

<commit_message>
Rapport du projet de diplome
</commit_message>
<xml_diff>
--- a/Rapport/IdéeJPA.pptx
+++ b/Rapport/IdéeJPA.pptx
@@ -291,7 +291,7 @@
           <a:p>
             <a:fld id="{16717350-796B-4695-9323-A84E4C71C2FB}" type="datetimeFigureOut">
               <a:rPr lang="fr-CH" smtClean="0"/>
-              <a:t>15.03.2013</a:t>
+              <a:t>10.04.2013</a:t>
             </a:fld>
             <a:endParaRPr lang="fr-CH"/>
           </a:p>
@@ -461,7 +461,7 @@
           <a:p>
             <a:fld id="{16717350-796B-4695-9323-A84E4C71C2FB}" type="datetimeFigureOut">
               <a:rPr lang="fr-CH" smtClean="0"/>
-              <a:t>15.03.2013</a:t>
+              <a:t>10.04.2013</a:t>
             </a:fld>
             <a:endParaRPr lang="fr-CH"/>
           </a:p>
@@ -641,7 +641,7 @@
           <a:p>
             <a:fld id="{16717350-796B-4695-9323-A84E4C71C2FB}" type="datetimeFigureOut">
               <a:rPr lang="fr-CH" smtClean="0"/>
-              <a:t>15.03.2013</a:t>
+              <a:t>10.04.2013</a:t>
             </a:fld>
             <a:endParaRPr lang="fr-CH"/>
           </a:p>
@@ -811,7 +811,7 @@
           <a:p>
             <a:fld id="{16717350-796B-4695-9323-A84E4C71C2FB}" type="datetimeFigureOut">
               <a:rPr lang="fr-CH" smtClean="0"/>
-              <a:t>15.03.2013</a:t>
+              <a:t>10.04.2013</a:t>
             </a:fld>
             <a:endParaRPr lang="fr-CH"/>
           </a:p>
@@ -1057,7 +1057,7 @@
           <a:p>
             <a:fld id="{16717350-796B-4695-9323-A84E4C71C2FB}" type="datetimeFigureOut">
               <a:rPr lang="fr-CH" smtClean="0"/>
-              <a:t>15.03.2013</a:t>
+              <a:t>10.04.2013</a:t>
             </a:fld>
             <a:endParaRPr lang="fr-CH"/>
           </a:p>
@@ -1345,7 +1345,7 @@
           <a:p>
             <a:fld id="{16717350-796B-4695-9323-A84E4C71C2FB}" type="datetimeFigureOut">
               <a:rPr lang="fr-CH" smtClean="0"/>
-              <a:t>15.03.2013</a:t>
+              <a:t>10.04.2013</a:t>
             </a:fld>
             <a:endParaRPr lang="fr-CH"/>
           </a:p>
@@ -1767,7 +1767,7 @@
           <a:p>
             <a:fld id="{16717350-796B-4695-9323-A84E4C71C2FB}" type="datetimeFigureOut">
               <a:rPr lang="fr-CH" smtClean="0"/>
-              <a:t>15.03.2013</a:t>
+              <a:t>10.04.2013</a:t>
             </a:fld>
             <a:endParaRPr lang="fr-CH"/>
           </a:p>
@@ -1885,7 +1885,7 @@
           <a:p>
             <a:fld id="{16717350-796B-4695-9323-A84E4C71C2FB}" type="datetimeFigureOut">
               <a:rPr lang="fr-CH" smtClean="0"/>
-              <a:t>15.03.2013</a:t>
+              <a:t>10.04.2013</a:t>
             </a:fld>
             <a:endParaRPr lang="fr-CH"/>
           </a:p>
@@ -1980,7 +1980,7 @@
           <a:p>
             <a:fld id="{16717350-796B-4695-9323-A84E4C71C2FB}" type="datetimeFigureOut">
               <a:rPr lang="fr-CH" smtClean="0"/>
-              <a:t>15.03.2013</a:t>
+              <a:t>10.04.2013</a:t>
             </a:fld>
             <a:endParaRPr lang="fr-CH"/>
           </a:p>
@@ -2257,7 +2257,7 @@
           <a:p>
             <a:fld id="{16717350-796B-4695-9323-A84E4C71C2FB}" type="datetimeFigureOut">
               <a:rPr lang="fr-CH" smtClean="0"/>
-              <a:t>15.03.2013</a:t>
+              <a:t>10.04.2013</a:t>
             </a:fld>
             <a:endParaRPr lang="fr-CH"/>
           </a:p>
@@ -2510,7 +2510,7 @@
           <a:p>
             <a:fld id="{16717350-796B-4695-9323-A84E4C71C2FB}" type="datetimeFigureOut">
               <a:rPr lang="fr-CH" smtClean="0"/>
-              <a:t>15.03.2013</a:t>
+              <a:t>10.04.2013</a:t>
             </a:fld>
             <a:endParaRPr lang="fr-CH"/>
           </a:p>
@@ -2723,7 +2723,7 @@
           <a:p>
             <a:fld id="{16717350-796B-4695-9323-A84E4C71C2FB}" type="datetimeFigureOut">
               <a:rPr lang="fr-CH" smtClean="0"/>
-              <a:t>15.03.2013</a:t>
+              <a:t>10.04.2013</a:t>
             </a:fld>
             <a:endParaRPr lang="fr-CH"/>
           </a:p>
@@ -3108,7 +3108,12 @@
             <p:ph type="ctrTitle"/>
           </p:nvPr>
         </p:nvSpPr>
-        <p:spPr/>
+        <p:spPr>
+          <a:xfrm>
+            <a:off x="539552" y="116632"/>
+            <a:ext cx="7772400" cy="1470025"/>
+          </a:xfrm>
+        </p:spPr>
         <p:txBody>
           <a:bodyPr/>
           <a:lstStyle/>
@@ -3131,7 +3136,12 @@
             <p:ph type="subTitle" idx="1"/>
           </p:nvPr>
         </p:nvSpPr>
-        <p:spPr/>
+        <p:spPr>
+          <a:xfrm>
+            <a:off x="1371600" y="1196752"/>
+            <a:ext cx="6400800" cy="4442048"/>
+          </a:xfrm>
+        </p:spPr>
         <p:txBody>
           <a:bodyPr>
             <a:normAutofit fontScale="85000" lnSpcReduction="20000"/>
@@ -3174,7 +3184,21 @@
             </a:pPr>
             <a:r>
               <a:rPr lang="fr-CH" dirty="0" smtClean="0"/>
-              <a:t>alternative</a:t>
+              <a:t>Alternative</a:t>
+            </a:r>
+          </a:p>
+          <a:p>
+            <a:pPr marL="457200" indent="-457200" algn="l">
+              <a:buFont typeface="Arial" pitchFamily="34" charset="0"/>
+              <a:buChar char="•"/>
+            </a:pPr>
+            <a:r>
+              <a:rPr lang="fr-CH" dirty="0" smtClean="0"/>
+              <a:t>- </a:t>
+            </a:r>
+            <a:r>
+              <a:rPr lang="en-US" dirty="0"/>
+              <a:t>The irony of JDBC is that, although the programming interfaces are portable, the SQL language is not. Despite the many attempts to standardize it, it is still rare to write SQL of any complexity that will run unchanged on two major database platforms.</a:t>
             </a:r>
             <a:endParaRPr lang="fr-CH" dirty="0"/>
           </a:p>
@@ -3254,8 +3278,58 @@
             </a:r>
             <a:r>
               <a:rPr lang="fr-CH" dirty="0" smtClean="0"/>
+              <a:t> </a:t>
+            </a:r>
+            <a:r>
+              <a:rPr lang="fr-CH" dirty="0" smtClean="0"/>
+              <a:t>class</a:t>
+            </a:r>
+          </a:p>
+          <a:p>
+            <a:pPr lvl="1"/>
+            <a:r>
+              <a:rPr lang="fr-CH" dirty="0" smtClean="0"/>
+              <a:t>Annotation JPA</a:t>
+            </a:r>
+          </a:p>
+          <a:p>
+            <a:pPr lvl="1"/>
+            <a:r>
+              <a:rPr lang="fr-CH" dirty="0" smtClean="0"/>
+              <a:t>Relation </a:t>
+            </a:r>
+            <a:r>
+              <a:rPr lang="fr-CH" dirty="0" err="1" smtClean="0"/>
+              <a:t>entity</a:t>
+            </a:r>
+            <a:r>
+              <a:rPr lang="fr-CH" dirty="0" smtClean="0"/>
+              <a:t> class-DB</a:t>
+            </a:r>
+          </a:p>
+          <a:p>
+            <a:pPr lvl="1"/>
+            <a:r>
+              <a:rPr lang="fr-CH" dirty="0" smtClean="0"/>
+              <a:t>Relation </a:t>
+            </a:r>
+            <a:r>
+              <a:rPr lang="fr-CH" dirty="0" err="1" smtClean="0"/>
+              <a:t>entity</a:t>
+            </a:r>
+            <a:r>
+              <a:rPr lang="fr-CH" dirty="0" smtClean="0"/>
+              <a:t> class-</a:t>
+            </a:r>
+            <a:r>
+              <a:rPr lang="fr-CH" dirty="0" err="1" smtClean="0"/>
+              <a:t>entity</a:t>
+            </a:r>
+            <a:r>
+              <a:rPr lang="fr-CH" dirty="0" smtClean="0"/>
               <a:t> class</a:t>
             </a:r>
+            <a:endParaRPr lang="fr-CH" dirty="0" smtClean="0"/>
           </a:p>
           <a:p>
             <a:r>
@@ -3263,27 +3337,46 @@
               <a:t>Entity</a:t>
             </a:r>
             <a:r>
-              <a:rPr lang="fr-CH" dirty="0"/>
-              <a:t> </a:t>
-            </a:r>
-            <a:r>
               <a:rPr lang="fr-CH" dirty="0" smtClean="0"/>
-              <a:t>Manager</a:t>
-            </a:r>
-          </a:p>
-          <a:p>
+              <a:t> Manager</a:t>
+            </a:r>
+          </a:p>
+          <a:p>
+            <a:pPr>
+              <a:buFontTx/>
+              <a:buChar char="-"/>
+            </a:pPr>
             <a:r>
               <a:rPr lang="fr-CH" dirty="0" smtClean="0"/>
-              <a:t>EJB session (</a:t>
-            </a:r>
+              <a:t>annotation EJB</a:t>
+            </a:r>
+          </a:p>
+          <a:p>
+            <a:pPr>
+              <a:buFontTx/>
+              <a:buChar char="-"/>
+            </a:pPr>
             <a:r>
               <a:rPr lang="fr-CH" dirty="0" err="1" smtClean="0"/>
-              <a:t>stateless</a:t>
-            </a:r>
+              <a:t>Persistence</a:t>
+            </a:r>
+            <a:endParaRPr lang="fr-CH" dirty="0" smtClean="0"/>
+          </a:p>
+          <a:p>
+            <a:pPr marL="0" indent="0">
+              <a:buNone/>
+            </a:pPr>
             <a:r>
               <a:rPr lang="fr-CH" dirty="0" smtClean="0"/>
-              <a:t>)</a:t>
-            </a:r>
+              <a:t>Web services</a:t>
+            </a:r>
+          </a:p>
+          <a:p>
+            <a:pPr>
+              <a:buFontTx/>
+              <a:buChar char="-"/>
+            </a:pPr>
+            <a:endParaRPr lang="fr-CH" dirty="0"/>
           </a:p>
         </p:txBody>
       </p:sp>
@@ -3334,15 +3427,11 @@
           <a:p>
             <a:r>
               <a:rPr lang="fr-CH" dirty="0" smtClean="0"/>
-              <a:t>Relation entre les </a:t>
+              <a:t>Relation entre les classes </a:t>
             </a:r>
             <a:r>
               <a:rPr lang="fr-CH" dirty="0" smtClean="0"/>
-              <a:t>classes d’</a:t>
-            </a:r>
-            <a:r>
-              <a:rPr lang="fr-CH" dirty="0" err="1" smtClean="0"/>
-              <a:t>entiés</a:t>
+              <a:t>d’entités</a:t>
             </a:r>
             <a:r>
               <a:rPr lang="fr-CH" dirty="0" smtClean="0"/>

</xml_diff>